<commit_message>
More splash page testing
</commit_message>
<xml_diff>
--- a/Management/LogoTesting.pptx
+++ b/Management/LogoTesting.pptx
@@ -104,6 +104,11 @@
       </a:defRPr>
     </a:lvl9pPr>
   </p:defaultTextStyle>
+  <p:extLst>
+    <p:ext uri="{EFAFB233-063F-42B5-8137-9DF3F51BA10A}">
+      <p15:sldGuideLst xmlns:p15="http://schemas.microsoft.com/office/powerpoint/2012/main"/>
+    </p:ext>
+  </p:extLst>
 </p:presentation>
 </file>
 
@@ -3321,118 +3326,143 @@
           <a:chExt cx="0" cy="0"/>
         </a:xfrm>
       </p:grpSpPr>
-      <p:sp>
-        <p:nvSpPr>
-          <p:cNvPr id="4" name="Rectangle 3">
-            <a:extLst>
-              <a:ext uri="{FF2B5EF4-FFF2-40B4-BE49-F238E27FC236}">
-                <a16:creationId xmlns:a16="http://schemas.microsoft.com/office/drawing/2014/main" id="{17A14B09-C5EE-574E-99E3-6AD7245A0919}"/>
-              </a:ext>
-            </a:extLst>
-          </p:cNvPr>
-          <p:cNvSpPr/>
+      <p:grpSp>
+        <p:nvGrpSpPr>
+          <p:cNvPr id="2" name="Group 1">
+            <a:extLst>
+              <a:ext uri="{FF2B5EF4-FFF2-40B4-BE49-F238E27FC236}">
+                <a16:creationId xmlns:a16="http://schemas.microsoft.com/office/drawing/2014/main" id="{F37E6700-E1FE-1E4E-B5C9-90ED7D516978}"/>
+              </a:ext>
+            </a:extLst>
+          </p:cNvPr>
+          <p:cNvGrpSpPr/>
           <p:nvPr/>
-        </p:nvSpPr>
-        <p:spPr>
+        </p:nvGrpSpPr>
+        <p:grpSpPr>
           <a:xfrm>
-            <a:off x="2660073" y="2277469"/>
-            <a:ext cx="5866410" cy="1569660"/>
+            <a:off x="2034561" y="1092529"/>
+            <a:ext cx="8190094" cy="3939540"/>
+            <a:chOff x="2034561" y="1092529"/>
+            <a:chExt cx="8190094" cy="3939540"/>
           </a:xfrm>
-          <a:prstGeom prst="rect">
-            <a:avLst/>
-          </a:prstGeom>
-        </p:spPr>
-        <p:txBody>
-          <a:bodyPr wrap="square">
-            <a:spAutoFit/>
-          </a:bodyPr>
-          <a:lstStyle/>
-          <a:p>
-            <a:pPr algn="ctr"/>
-            <a:r>
-              <a:rPr lang="en-US" sz="9600" dirty="0">
-                <a:ln>
-                  <a:noFill/>
-                </a:ln>
-                <a:gradFill>
-                  <a:gsLst>
-                    <a:gs pos="21000">
-                      <a:srgbClr val="53575C"/>
-                    </a:gs>
-                    <a:gs pos="88000">
-                      <a:srgbClr val="C5C7CA"/>
-                    </a:gs>
-                  </a:gsLst>
-                  <a:lin ang="5400000" scaled="0"/>
-                </a:gradFill>
+        </p:grpSpPr>
+        <p:sp>
+          <p:nvSpPr>
+            <p:cNvPr id="5" name="Rectangle 4">
+              <a:extLst>
+                <a:ext uri="{FF2B5EF4-FFF2-40B4-BE49-F238E27FC236}">
+                  <a16:creationId xmlns:a16="http://schemas.microsoft.com/office/drawing/2014/main" id="{8B99D66F-F541-4040-B377-329F1ADCB403}"/>
+                </a:ext>
+              </a:extLst>
+            </p:cNvPr>
+            <p:cNvSpPr/>
+            <p:nvPr/>
+          </p:nvSpPr>
+          <p:spPr>
+            <a:xfrm>
+              <a:off x="7346987" y="1092529"/>
+              <a:ext cx="2877668" cy="3939540"/>
+            </a:xfrm>
+            <a:prstGeom prst="rect">
+              <a:avLst/>
+            </a:prstGeom>
+          </p:spPr>
+          <p:txBody>
+            <a:bodyPr wrap="square">
+              <a:spAutoFit/>
+            </a:bodyPr>
+            <a:lstStyle/>
+            <a:p>
+              <a:pPr algn="ctr"/>
+              <a:r>
+                <a:rPr lang="en-US" sz="25000" dirty="0">
+                  <a:ln>
+                    <a:noFill/>
+                  </a:ln>
+                  <a:solidFill>
+                    <a:srgbClr val="7030A0"/>
+                  </a:solidFill>
+                  <a:effectLst/>
+                  <a:latin typeface="Bradley Hand" pitchFamily="2" charset="77"/>
+                  <a:ea typeface="Calibri" panose="020F0502020204030204" pitchFamily="34" charset="0"/>
+                  <a:cs typeface="Times New Roman" panose="02020603050405020304" pitchFamily="18" charset="0"/>
+                </a:rPr>
+                <a:t>X</a:t>
+              </a:r>
+              <a:endParaRPr lang="en-US" sz="25000" dirty="0">
                 <a:effectLst/>
-                <a:latin typeface="Century Gothic" panose="020B0502020202020204" pitchFamily="34" charset="0"/>
+                <a:latin typeface="Calibri" panose="020F0502020204030204" pitchFamily="34" charset="0"/>
                 <a:ea typeface="Calibri" panose="020F0502020204030204" pitchFamily="34" charset="0"/>
                 <a:cs typeface="Times New Roman" panose="02020603050405020304" pitchFamily="18" charset="0"/>
-              </a:rPr>
-              <a:t>Mentor</a:t>
-            </a:r>
-            <a:endParaRPr lang="en-US" sz="800" dirty="0">
-              <a:effectLst/>
-              <a:latin typeface="Calibri" panose="020F0502020204030204" pitchFamily="34" charset="0"/>
-              <a:ea typeface="Calibri" panose="020F0502020204030204" pitchFamily="34" charset="0"/>
-              <a:cs typeface="Times New Roman" panose="02020603050405020304" pitchFamily="18" charset="0"/>
-            </a:endParaRPr>
-          </a:p>
-        </p:txBody>
-      </p:sp>
-      <p:sp>
-        <p:nvSpPr>
-          <p:cNvPr id="5" name="Rectangle 4">
-            <a:extLst>
-              <a:ext uri="{FF2B5EF4-FFF2-40B4-BE49-F238E27FC236}">
-                <a16:creationId xmlns:a16="http://schemas.microsoft.com/office/drawing/2014/main" id="{8B99D66F-F541-4040-B377-329F1ADCB403}"/>
-              </a:ext>
-            </a:extLst>
-          </p:cNvPr>
-          <p:cNvSpPr/>
-          <p:nvPr/>
-        </p:nvSpPr>
-        <p:spPr>
-          <a:xfrm>
-            <a:off x="7346987" y="1092529"/>
-            <a:ext cx="2877668" cy="3939540"/>
-          </a:xfrm>
-          <a:prstGeom prst="rect">
-            <a:avLst/>
-          </a:prstGeom>
-        </p:spPr>
-        <p:txBody>
-          <a:bodyPr wrap="square">
-            <a:spAutoFit/>
-          </a:bodyPr>
-          <a:lstStyle/>
-          <a:p>
-            <a:pPr algn="ctr"/>
-            <a:r>
-              <a:rPr lang="en-US" sz="25000" dirty="0">
-                <a:ln>
-                  <a:noFill/>
-                </a:ln>
-                <a:solidFill>
-                  <a:srgbClr val="7030A0"/>
-                </a:solidFill>
+              </a:endParaRPr>
+            </a:p>
+          </p:txBody>
+        </p:sp>
+        <p:sp>
+          <p:nvSpPr>
+            <p:cNvPr id="7" name="Rectangle 6">
+              <a:extLst>
+                <a:ext uri="{FF2B5EF4-FFF2-40B4-BE49-F238E27FC236}">
+                  <a16:creationId xmlns:a16="http://schemas.microsoft.com/office/drawing/2014/main" id="{28249BAA-FC9B-F04B-9549-564156DE0765}"/>
+                </a:ext>
+              </a:extLst>
+            </p:cNvPr>
+            <p:cNvSpPr/>
+            <p:nvPr/>
+          </p:nvSpPr>
+          <p:spPr>
+            <a:xfrm>
+              <a:off x="2034561" y="2277469"/>
+              <a:ext cx="6094938" cy="1569660"/>
+            </a:xfrm>
+            <a:prstGeom prst="rect">
+              <a:avLst/>
+            </a:prstGeom>
+          </p:spPr>
+          <p:txBody>
+            <a:bodyPr wrap="none">
+              <a:spAutoFit/>
+            </a:bodyPr>
+            <a:lstStyle/>
+            <a:p>
+              <a:pPr algn="ctr"/>
+              <a:r>
+                <a:rPr lang="en-US" sz="9600" b="1" dirty="0">
+                  <a:ln w="9525" cap="flat" cmpd="sng" algn="ctr">
+                    <a:solidFill>
+                      <a:srgbClr val="FFFFFF"/>
+                    </a:solidFill>
+                    <a:prstDash val="solid"/>
+                    <a:round/>
+                  </a:ln>
+                  <a:gradFill>
+                    <a:gsLst>
+                      <a:gs pos="21000">
+                        <a:srgbClr val="53575C"/>
+                      </a:gs>
+                      <a:gs pos="88000">
+                        <a:srgbClr val="C5C7CA"/>
+                      </a:gs>
+                    </a:gsLst>
+                    <a:lin ang="5400000" scaled="0"/>
+                  </a:gradFill>
+                  <a:effectLst/>
+                  <a:latin typeface="Century Gothic" panose="020B0502020202020204" pitchFamily="34" charset="0"/>
+                  <a:ea typeface="Calibri" panose="020F0502020204030204" pitchFamily="34" charset="0"/>
+                  <a:cs typeface="Times New Roman" panose="02020603050405020304" pitchFamily="18" charset="0"/>
+                </a:rPr>
+                <a:t>     Mentor</a:t>
+              </a:r>
+              <a:endParaRPr lang="en-US" sz="800" b="1" dirty="0">
                 <a:effectLst/>
-                <a:latin typeface="Bradley Hand" pitchFamily="2" charset="77"/>
+                <a:latin typeface="Calibri" panose="020F0502020204030204" pitchFamily="34" charset="0"/>
                 <a:ea typeface="Calibri" panose="020F0502020204030204" pitchFamily="34" charset="0"/>
                 <a:cs typeface="Times New Roman" panose="02020603050405020304" pitchFamily="18" charset="0"/>
-              </a:rPr>
-              <a:t>X</a:t>
-            </a:r>
-            <a:endParaRPr lang="en-US" sz="25000" dirty="0">
-              <a:effectLst/>
-              <a:latin typeface="Calibri" panose="020F0502020204030204" pitchFamily="34" charset="0"/>
-              <a:ea typeface="Calibri" panose="020F0502020204030204" pitchFamily="34" charset="0"/>
-              <a:cs typeface="Times New Roman" panose="02020603050405020304" pitchFamily="18" charset="0"/>
-            </a:endParaRPr>
-          </a:p>
-        </p:txBody>
-      </p:sp>
+              </a:endParaRPr>
+            </a:p>
+          </p:txBody>
+        </p:sp>
+      </p:grpSp>
     </p:spTree>
     <p:extLst>
       <p:ext uri="{BB962C8B-B14F-4D97-AF65-F5344CB8AC3E}">

</xml_diff>